<commit_message>
add slide for nomades
</commit_message>
<xml_diff>
--- a/docs/Drupal Custom Factory 8.pptx
+++ b/docs/Drupal Custom Factory 8.pptx
@@ -30,6 +30,7 @@
     <p:sldId id="284" r:id="rId24"/>
     <p:sldId id="275" r:id="rId25"/>
     <p:sldId id="276" r:id="rId26"/>
+    <p:sldId id="296" r:id="rId27"/>
   </p:sldIdLst>
   <p:sldSz cx="9144000" cy="6858000" type="screen4x3"/>
   <p:notesSz cx="6858000" cy="9144000"/>
@@ -299,7 +300,7 @@
             <a:fld id="{47C9B81F-C347-4BEF-BFDF-29C42F48304A}" type="datetimeFigureOut">
               <a:rPr lang="en-US" smtClean="0"/>
               <a:pPr/>
-              <a:t>11/30/2016</a:t>
+              <a:t>12/18/2016</a:t>
             </a:fld>
             <a:endParaRPr lang="en-US"/>
           </a:p>
@@ -466,7 +467,7 @@
             <a:fld id="{47C9B81F-C347-4BEF-BFDF-29C42F48304A}" type="datetimeFigureOut">
               <a:rPr lang="en-US" smtClean="0"/>
               <a:pPr/>
-              <a:t>11/30/2016</a:t>
+              <a:t>12/18/2016</a:t>
             </a:fld>
             <a:endParaRPr lang="en-US"/>
           </a:p>
@@ -643,7 +644,7 @@
             <a:fld id="{47C9B81F-C347-4BEF-BFDF-29C42F48304A}" type="datetimeFigureOut">
               <a:rPr lang="en-US" smtClean="0"/>
               <a:pPr/>
-              <a:t>11/30/2016</a:t>
+              <a:t>12/18/2016</a:t>
             </a:fld>
             <a:endParaRPr lang="en-US"/>
           </a:p>
@@ -810,7 +811,7 @@
             <a:fld id="{47C9B81F-C347-4BEF-BFDF-29C42F48304A}" type="datetimeFigureOut">
               <a:rPr lang="en-US" smtClean="0"/>
               <a:pPr/>
-              <a:t>11/30/2016</a:t>
+              <a:t>12/18/2016</a:t>
             </a:fld>
             <a:endParaRPr lang="en-US"/>
           </a:p>
@@ -1048,7 +1049,7 @@
             <a:fld id="{47C9B81F-C347-4BEF-BFDF-29C42F48304A}" type="datetimeFigureOut">
               <a:rPr lang="en-US" smtClean="0"/>
               <a:pPr/>
-              <a:t>11/30/2016</a:t>
+              <a:t>12/18/2016</a:t>
             </a:fld>
             <a:endParaRPr lang="en-US"/>
           </a:p>
@@ -1314,7 +1315,7 @@
             <a:fld id="{47C9B81F-C347-4BEF-BFDF-29C42F48304A}" type="datetimeFigureOut">
               <a:rPr lang="en-US" smtClean="0"/>
               <a:pPr/>
-              <a:t>11/30/2016</a:t>
+              <a:t>12/18/2016</a:t>
             </a:fld>
             <a:endParaRPr lang="en-US"/>
           </a:p>
@@ -1694,7 +1695,7 @@
             <a:fld id="{47C9B81F-C347-4BEF-BFDF-29C42F48304A}" type="datetimeFigureOut">
               <a:rPr lang="en-US" smtClean="0"/>
               <a:pPr/>
-              <a:t>11/30/2016</a:t>
+              <a:t>12/18/2016</a:t>
             </a:fld>
             <a:endParaRPr lang="en-US"/>
           </a:p>
@@ -1846,7 +1847,7 @@
             <a:fld id="{47C9B81F-C347-4BEF-BFDF-29C42F48304A}" type="datetimeFigureOut">
               <a:rPr lang="en-US" smtClean="0"/>
               <a:pPr/>
-              <a:t>11/30/2016</a:t>
+              <a:t>12/18/2016</a:t>
             </a:fld>
             <a:endParaRPr lang="en-US"/>
           </a:p>
@@ -1938,7 +1939,7 @@
             <a:fld id="{47C9B81F-C347-4BEF-BFDF-29C42F48304A}" type="datetimeFigureOut">
               <a:rPr lang="en-US" smtClean="0"/>
               <a:pPr/>
-              <a:t>11/30/2016</a:t>
+              <a:t>12/18/2016</a:t>
             </a:fld>
             <a:endParaRPr lang="en-US"/>
           </a:p>
@@ -2201,7 +2202,7 @@
             <a:fld id="{47C9B81F-C347-4BEF-BFDF-29C42F48304A}" type="datetimeFigureOut">
               <a:rPr lang="en-US" smtClean="0"/>
               <a:pPr/>
-              <a:t>11/30/2016</a:t>
+              <a:t>12/18/2016</a:t>
             </a:fld>
             <a:endParaRPr lang="en-US"/>
           </a:p>
@@ -2491,7 +2492,7 @@
             <a:fld id="{47C9B81F-C347-4BEF-BFDF-29C42F48304A}" type="datetimeFigureOut">
               <a:rPr lang="en-US" smtClean="0"/>
               <a:pPr/>
-              <a:t>11/30/2016</a:t>
+              <a:t>12/18/2016</a:t>
             </a:fld>
             <a:endParaRPr lang="en-US"/>
           </a:p>
@@ -3260,7 +3261,7 @@
             <a:fld id="{47C9B81F-C347-4BEF-BFDF-29C42F48304A}" type="datetimeFigureOut">
               <a:rPr lang="en-US" smtClean="0"/>
               <a:pPr/>
-              <a:t>11/30/2016</a:t>
+              <a:t>12/18/2016</a:t>
             </a:fld>
             <a:endParaRPr lang="en-US" dirty="0">
               <a:solidFill>
@@ -3749,15 +3750,7 @@
           <a:p>
             <a:r>
               <a:rPr lang="fr-FR" dirty="0" smtClean="0"/>
-              <a:t>Drupal </a:t>
-            </a:r>
-            <a:r>
-              <a:rPr lang="fr-FR" dirty="0" smtClean="0"/>
-              <a:t>8 </a:t>
-            </a:r>
-            <a:r>
-              <a:rPr lang="fr-FR" dirty="0" smtClean="0"/>
-              <a:t>Custom </a:t>
+              <a:t>Drupal 8 Custom </a:t>
             </a:r>
             <a:r>
               <a:rPr lang="fr-FR" dirty="0" err="1" smtClean="0"/>
@@ -11159,15 +11152,7 @@
           <a:p>
             <a:r>
               <a:rPr lang="fr-FR" sz="3000" dirty="0" smtClean="0"/>
-              <a:t>Drupal </a:t>
-            </a:r>
-            <a:r>
-              <a:rPr lang="fr-FR" sz="3000" dirty="0" smtClean="0"/>
-              <a:t>8 </a:t>
-            </a:r>
-            <a:r>
-              <a:rPr lang="fr-FR" sz="3000" dirty="0" smtClean="0"/>
-              <a:t>custom </a:t>
+              <a:t>Drupal 8 custom </a:t>
             </a:r>
             <a:r>
               <a:rPr lang="fr-FR" sz="3000" dirty="0" err="1" smtClean="0"/>
@@ -11221,19 +11206,7 @@
               <a:rPr lang="en-GB" sz="2200" dirty="0" smtClean="0">
                 <a:latin typeface="+mj-lt"/>
               </a:rPr>
-              <a:t>A Drupal </a:t>
-            </a:r>
-            <a:r>
-              <a:rPr lang="en-GB" sz="2200" dirty="0" smtClean="0">
-                <a:latin typeface="+mj-lt"/>
-              </a:rPr>
-              <a:t>8 </a:t>
-            </a:r>
-            <a:r>
-              <a:rPr lang="en-GB" sz="2200" dirty="0" smtClean="0">
-                <a:latin typeface="+mj-lt"/>
-              </a:rPr>
-              <a:t>distribution ready to install, use, and deploy</a:t>
+              <a:t>A Drupal 8 distribution ready to install, use, and deploy</a:t>
             </a:r>
           </a:p>
           <a:p>
@@ -11321,13 +11294,7 @@
               <a:rPr lang="en-GB" sz="2200" dirty="0" smtClean="0">
                 <a:latin typeface="+mj-lt"/>
               </a:rPr>
-              <a:t>More native features for </a:t>
-            </a:r>
-            <a:r>
-              <a:rPr lang="en-GB" sz="2200" dirty="0" smtClean="0">
-                <a:latin typeface="+mj-lt"/>
-              </a:rPr>
-              <a:t>administrator/contributor</a:t>
+              <a:t>More native features for administrator/contributor</a:t>
             </a:r>
           </a:p>
           <a:p>
@@ -11342,9 +11309,6 @@
               </a:rPr>
               <a:t>Ready to use with angular 2 and ionic 2</a:t>
             </a:r>
-            <a:endParaRPr lang="en-GB" sz="2200" dirty="0" smtClean="0">
-              <a:latin typeface="+mj-lt"/>
-            </a:endParaRPr>
           </a:p>
           <a:p>
             <a:pPr lvl="1">
@@ -12437,14 +12401,14 @@
           <a:effectLst/>
           <a:extLst>
             <a:ext uri="{909E8E84-426E-40DD-AFC4-6F175D3DCCD1}">
-              <a14:hiddenFill xmlns:a14="http://schemas.microsoft.com/office/drawing/2010/main" xmlns="">
+              <a14:hiddenFill xmlns="" xmlns:a14="http://schemas.microsoft.com/office/drawing/2010/main">
                 <a:solidFill>
                   <a:schemeClr val="accent1"/>
                 </a:solidFill>
               </a14:hiddenFill>
             </a:ext>
             <a:ext uri="{91240B29-F687-4F45-9708-019B960494DF}">
-              <a14:hiddenLine xmlns:a14="http://schemas.microsoft.com/office/drawing/2010/main" xmlns="" w="9525">
+              <a14:hiddenLine xmlns="" xmlns:a14="http://schemas.microsoft.com/office/drawing/2010/main" w="9525">
                 <a:solidFill>
                   <a:schemeClr val="tx1"/>
                 </a:solidFill>
@@ -12454,7 +12418,7 @@
               </a14:hiddenLine>
             </a:ext>
             <a:ext uri="{AF507438-7753-43E0-B8FC-AC1667EBCBE1}">
-              <a14:hiddenEffects xmlns:a14="http://schemas.microsoft.com/office/drawing/2010/main" xmlns="">
+              <a14:hiddenEffects xmlns="" xmlns:a14="http://schemas.microsoft.com/office/drawing/2010/main">
                 <a:effectLst>
                   <a:outerShdw dist="35921" dir="2700000" algn="ctr" rotWithShape="0">
                     <a:schemeClr val="bg2"/>
@@ -12874,14 +12838,14 @@
           <a:effectLst/>
           <a:extLst>
             <a:ext uri="{909E8E84-426E-40DD-AFC4-6F175D3DCCD1}">
-              <a14:hiddenFill xmlns:a14="http://schemas.microsoft.com/office/drawing/2010/main" xmlns="">
+              <a14:hiddenFill xmlns="" xmlns:a14="http://schemas.microsoft.com/office/drawing/2010/main">
                 <a:solidFill>
                   <a:schemeClr val="accent1"/>
                 </a:solidFill>
               </a14:hiddenFill>
             </a:ext>
             <a:ext uri="{91240B29-F687-4F45-9708-019B960494DF}">
-              <a14:hiddenLine xmlns:a14="http://schemas.microsoft.com/office/drawing/2010/main" xmlns="" w="9525">
+              <a14:hiddenLine xmlns="" xmlns:a14="http://schemas.microsoft.com/office/drawing/2010/main" w="9525">
                 <a:solidFill>
                   <a:schemeClr val="tx1"/>
                 </a:solidFill>
@@ -12891,7 +12855,7 @@
               </a14:hiddenLine>
             </a:ext>
             <a:ext uri="{AF507438-7753-43E0-B8FC-AC1667EBCBE1}">
-              <a14:hiddenEffects xmlns:a14="http://schemas.microsoft.com/office/drawing/2010/main" xmlns="">
+              <a14:hiddenEffects xmlns="" xmlns:a14="http://schemas.microsoft.com/office/drawing/2010/main">
                 <a:effectLst>
                   <a:outerShdw dist="35921" dir="2700000" algn="ctr" rotWithShape="0">
                     <a:schemeClr val="bg2"/>
@@ -15011,7 +14975,7 @@
 </p:sld>
 </file>
 
-<file path=ppt/slides/slide3.xml><?xml version="1.0" encoding="utf-8"?>
+<file path=ppt/slides/slide26.xml><?xml version="1.0" encoding="utf-8"?>
 <p:sld xmlns:a="http://schemas.openxmlformats.org/drawingml/2006/main" xmlns:r="http://schemas.openxmlformats.org/officeDocument/2006/relationships" xmlns:p="http://schemas.openxmlformats.org/presentationml/2006/main">
   <p:cSld>
     <p:spTree>
@@ -15074,11 +15038,15 @@
           <a:p>
             <a:r>
               <a:rPr lang="en-GB" sz="3200" dirty="0" smtClean="0"/>
-              <a:t>Classic Drupal </a:t>
+              <a:t>Drupal 8 – </a:t>
+            </a:r>
+            <a:r>
+              <a:rPr lang="en-GB" sz="3200" dirty="0" err="1" smtClean="0"/>
+              <a:t>AngularJS</a:t>
             </a:r>
             <a:r>
               <a:rPr lang="en-GB" sz="3200" dirty="0" smtClean="0"/>
-              <a:t>8 deployment</a:t>
+              <a:t> 2 integration</a:t>
             </a:r>
             <a:endParaRPr lang="fr-FR" sz="3000" dirty="0"/>
           </a:p>
@@ -15122,8 +15090,8 @@
         </p:nvSpPr>
         <p:spPr>
           <a:xfrm>
-            <a:off x="907366" y="4298609"/>
-            <a:ext cx="1266092" cy="276999"/>
+            <a:off x="3131840" y="2924944"/>
+            <a:ext cx="906052" cy="646331"/>
           </a:xfrm>
           <a:prstGeom prst="rect">
             <a:avLst/>
@@ -15135,9 +15103,7 @@
             </a:schemeClr>
           </a:solidFill>
           <a:ln>
-            <a:solidFill>
-              <a:schemeClr val="accent1"/>
-            </a:solidFill>
+            <a:noFill/>
           </a:ln>
         </p:spPr>
         <p:txBody>
@@ -15151,7 +15117,37 @@
               <a:rPr lang="fr-FR" sz="1200" dirty="0" smtClean="0">
                 <a:latin typeface="+mj-lt"/>
               </a:rPr>
-              <a:t>DEV</a:t>
+              <a:t>DCF</a:t>
+            </a:r>
+          </a:p>
+          <a:p>
+            <a:pPr algn="ctr"/>
+            <a:r>
+              <a:rPr lang="fr-FR" sz="1200" dirty="0" err="1" smtClean="0">
+                <a:latin typeface="+mj-lt"/>
+              </a:rPr>
+              <a:t>Angular</a:t>
+            </a:r>
+            <a:r>
+              <a:rPr lang="fr-FR" sz="1200" dirty="0" err="1" smtClean="0">
+                <a:latin typeface="+mj-lt"/>
+              </a:rPr>
+              <a:t>Js</a:t>
+            </a:r>
+            <a:r>
+              <a:rPr lang="fr-FR" sz="1200" dirty="0" smtClean="0">
+                <a:latin typeface="+mj-lt"/>
+              </a:rPr>
+              <a:t> 2</a:t>
+            </a:r>
+          </a:p>
+          <a:p>
+            <a:pPr algn="ctr"/>
+            <a:r>
+              <a:rPr lang="fr-FR" sz="1200" dirty="0" smtClean="0">
+                <a:latin typeface="+mj-lt"/>
+              </a:rPr>
+              <a:t>API</a:t>
             </a:r>
             <a:endParaRPr lang="fr-FR" sz="1200" dirty="0">
               <a:latin typeface="+mj-lt"/>
@@ -15167,8 +15163,8 @@
         </p:nvSpPr>
         <p:spPr>
           <a:xfrm>
-            <a:off x="6414869" y="4298609"/>
-            <a:ext cx="1519310" cy="276999"/>
+            <a:off x="5436096" y="2823319"/>
+            <a:ext cx="720080" cy="461665"/>
           </a:xfrm>
           <a:prstGeom prst="rect">
             <a:avLst/>
@@ -15180,9 +15176,7 @@
             </a:schemeClr>
           </a:solidFill>
           <a:ln>
-            <a:solidFill>
-              <a:schemeClr val="accent1"/>
-            </a:solidFill>
+            <a:noFill/>
           </a:ln>
         </p:spPr>
         <p:txBody>
@@ -15196,7 +15190,7 @@
               <a:rPr lang="fr-FR" sz="1200" dirty="0" smtClean="0">
                 <a:latin typeface="+mj-lt"/>
               </a:rPr>
-              <a:t>PROD</a:t>
+              <a:t>DCF modules</a:t>
             </a:r>
             <a:endParaRPr lang="fr-FR" sz="1200" dirty="0">
               <a:latin typeface="+mj-lt"/>
@@ -15206,14 +15200,366 @@
       </p:sp>
       <p:sp>
         <p:nvSpPr>
-          <p:cNvPr id="9" name="TextBox 5"/>
+          <p:cNvPr id="10" name="Smiley Face 2"/>
+          <p:cNvSpPr/>
+          <p:nvPr/>
+        </p:nvSpPr>
+        <p:spPr bwMode="auto">
+          <a:xfrm>
+            <a:off x="467544" y="2996952"/>
+            <a:ext cx="422031" cy="400929"/>
+          </a:xfrm>
+          <a:prstGeom prst="smileyFace">
+            <a:avLst/>
+          </a:prstGeom>
+          <a:solidFill>
+            <a:srgbClr val="003366">
+              <a:alpha val="50000"/>
+            </a:srgbClr>
+          </a:solidFill>
+          <a:ln w="9525" cap="flat" cmpd="sng" algn="ctr">
+            <a:solidFill>
+              <a:schemeClr val="tx2"/>
+            </a:solidFill>
+            <a:prstDash val="solid"/>
+            <a:round/>
+            <a:headEnd type="none" w="med" len="med"/>
+            <a:tailEnd type="none" w="med" len="med"/>
+          </a:ln>
+          <a:effectLst/>
+        </p:spPr>
+        <p:txBody>
+          <a:bodyPr vert="horz" wrap="none" lIns="0" tIns="0" rIns="0" bIns="0" numCol="1" rtlCol="0" anchor="ctr" anchorCtr="0" compatLnSpc="1">
+            <a:prstTxWarp prst="textNoShape">
+              <a:avLst/>
+            </a:prstTxWarp>
+          </a:bodyPr>
+          <a:lstStyle/>
+          <a:p>
+            <a:pPr marL="0" marR="0" indent="0" algn="ctr" defTabSz="914400" rtl="0" eaLnBrk="1" fontAlgn="base" latinLnBrk="0" hangingPunct="1">
+              <a:lnSpc>
+                <a:spcPct val="100000"/>
+              </a:lnSpc>
+              <a:spcBef>
+                <a:spcPct val="20000"/>
+              </a:spcBef>
+              <a:spcAft>
+                <a:spcPct val="0"/>
+              </a:spcAft>
+              <a:buClrTx/>
+              <a:buSzPct val="80000"/>
+              <a:buFontTx/>
+              <a:buNone/>
+              <a:tabLst/>
+            </a:pPr>
+            <a:endParaRPr kumimoji="0" lang="fr-FR" sz="1200" b="0" i="0" u="none" strike="noStrike" cap="none" normalizeH="0" baseline="0" smtClean="0">
+              <a:ln>
+                <a:noFill/>
+              </a:ln>
+              <a:solidFill>
+                <a:srgbClr val="003366"/>
+              </a:solidFill>
+              <a:effectLst/>
+              <a:latin typeface="+mj-lt"/>
+              <a:cs typeface="Arial" charset="0"/>
+            </a:endParaRPr>
+          </a:p>
+        </p:txBody>
+      </p:sp>
+      <p:cxnSp>
+        <p:nvCxnSpPr>
+          <p:cNvPr id="17" name="Straight Arrow Connector 20"/>
+          <p:cNvCxnSpPr>
+            <a:stCxn id="7" idx="3"/>
+          </p:cNvCxnSpPr>
+          <p:nvPr/>
+        </p:nvCxnSpPr>
+        <p:spPr bwMode="auto">
+          <a:xfrm>
+            <a:off x="4037892" y="3248110"/>
+            <a:ext cx="1398204" cy="36874"/>
+          </a:xfrm>
+          <a:prstGeom prst="straightConnector1">
+            <a:avLst/>
+          </a:prstGeom>
+          <a:solidFill>
+            <a:srgbClr val="003366">
+              <a:alpha val="50000"/>
+            </a:srgbClr>
+          </a:solidFill>
+          <a:ln w="9525" cap="flat" cmpd="sng" algn="ctr">
+            <a:solidFill>
+              <a:schemeClr val="tx1"/>
+            </a:solidFill>
+            <a:prstDash val="solid"/>
+            <a:round/>
+            <a:headEnd type="arrow" w="med" len="med"/>
+            <a:tailEnd type="arrow"/>
+          </a:ln>
+          <a:effectLst/>
+        </p:spPr>
+      </p:cxnSp>
+      <p:cxnSp>
+        <p:nvCxnSpPr>
+          <p:cNvPr id="19" name="Straight Arrow Connector 26"/>
+          <p:cNvCxnSpPr>
+            <a:endCxn id="49" idx="1"/>
+          </p:cNvCxnSpPr>
+          <p:nvPr/>
+        </p:nvCxnSpPr>
+        <p:spPr bwMode="auto">
+          <a:xfrm>
+            <a:off x="1043608" y="3284984"/>
+            <a:ext cx="864096" cy="36004"/>
+          </a:xfrm>
+          <a:prstGeom prst="straightConnector1">
+            <a:avLst/>
+          </a:prstGeom>
+          <a:solidFill>
+            <a:srgbClr val="003366">
+              <a:alpha val="50000"/>
+            </a:srgbClr>
+          </a:solidFill>
+          <a:ln w="9525" cap="flat" cmpd="sng" algn="ctr">
+            <a:solidFill>
+              <a:schemeClr val="tx1"/>
+            </a:solidFill>
+            <a:prstDash val="solid"/>
+            <a:round/>
+            <a:headEnd type="arrow" w="med" len="med"/>
+            <a:tailEnd type="arrow"/>
+          </a:ln>
+          <a:effectLst/>
+        </p:spPr>
+      </p:cxnSp>
+      <p:sp>
+        <p:nvSpPr>
+          <p:cNvPr id="44" name="TextBox 4"/>
           <p:cNvSpPr txBox="1"/>
           <p:nvPr/>
         </p:nvSpPr>
         <p:spPr>
           <a:xfrm>
-            <a:off x="3756074" y="3096750"/>
-            <a:ext cx="1266092" cy="276999"/>
+            <a:off x="5436096" y="3284984"/>
+            <a:ext cx="720080" cy="646331"/>
+          </a:xfrm>
+          <a:prstGeom prst="rect">
+            <a:avLst/>
+          </a:prstGeom>
+          <a:solidFill>
+            <a:srgbClr val="7030A0"/>
+          </a:solidFill>
+          <a:ln>
+            <a:noFill/>
+          </a:ln>
+        </p:spPr>
+        <p:txBody>
+          <a:bodyPr wrap="square" rtlCol="0">
+            <a:spAutoFit/>
+          </a:bodyPr>
+          <a:lstStyle/>
+          <a:p>
+            <a:pPr algn="ctr"/>
+            <a:r>
+              <a:rPr lang="fr-FR" sz="1200" dirty="0" smtClean="0">
+                <a:latin typeface="+mj-lt"/>
+              </a:rPr>
+              <a:t>REST API module</a:t>
+            </a:r>
+            <a:endParaRPr lang="fr-FR" sz="1200" dirty="0">
+              <a:latin typeface="+mj-lt"/>
+            </a:endParaRPr>
+          </a:p>
+        </p:txBody>
+      </p:sp>
+      <p:sp>
+        <p:nvSpPr>
+          <p:cNvPr id="46" name="TextBox 4"/>
+          <p:cNvSpPr txBox="1"/>
+          <p:nvPr/>
+        </p:nvSpPr>
+        <p:spPr>
+          <a:xfrm>
+            <a:off x="6156176" y="2564904"/>
+            <a:ext cx="1224136" cy="2160240"/>
+          </a:xfrm>
+          <a:prstGeom prst="rect">
+            <a:avLst/>
+          </a:prstGeom>
+          <a:solidFill>
+            <a:srgbClr val="7030A0"/>
+          </a:solidFill>
+          <a:ln>
+            <a:noFill/>
+          </a:ln>
+        </p:spPr>
+        <p:txBody>
+          <a:bodyPr wrap="square" rtlCol="0">
+            <a:noAutofit/>
+          </a:bodyPr>
+          <a:lstStyle/>
+          <a:p>
+            <a:pPr algn="ctr"/>
+            <a:endParaRPr lang="fr-FR" sz="1200" dirty="0" smtClean="0">
+              <a:latin typeface="+mj-lt"/>
+            </a:endParaRPr>
+          </a:p>
+          <a:p>
+            <a:pPr algn="ctr"/>
+            <a:endParaRPr lang="fr-FR" sz="1200" dirty="0" smtClean="0">
+              <a:latin typeface="+mj-lt"/>
+            </a:endParaRPr>
+          </a:p>
+          <a:p>
+            <a:pPr algn="ctr"/>
+            <a:endParaRPr lang="fr-FR" sz="1200" dirty="0" smtClean="0">
+              <a:latin typeface="+mj-lt"/>
+            </a:endParaRPr>
+          </a:p>
+          <a:p>
+            <a:pPr algn="ctr"/>
+            <a:endParaRPr lang="fr-FR" sz="1200" dirty="0" smtClean="0">
+              <a:latin typeface="+mj-lt"/>
+            </a:endParaRPr>
+          </a:p>
+          <a:p>
+            <a:pPr algn="ctr"/>
+            <a:r>
+              <a:rPr lang="fr-FR" sz="1200" dirty="0" smtClean="0">
+                <a:latin typeface="+mj-lt"/>
+              </a:rPr>
+              <a:t>Drupal8</a:t>
+            </a:r>
+            <a:endParaRPr lang="fr-FR" sz="1200" dirty="0">
+              <a:latin typeface="+mj-lt"/>
+            </a:endParaRPr>
+          </a:p>
+        </p:txBody>
+      </p:sp>
+      <p:sp>
+        <p:nvSpPr>
+          <p:cNvPr id="47" name="TextBox 4"/>
+          <p:cNvSpPr txBox="1"/>
+          <p:nvPr/>
+        </p:nvSpPr>
+        <p:spPr>
+          <a:xfrm>
+            <a:off x="7380312" y="3645024"/>
+            <a:ext cx="1224136" cy="504056"/>
+          </a:xfrm>
+          <a:prstGeom prst="rect">
+            <a:avLst/>
+          </a:prstGeom>
+          <a:solidFill>
+            <a:schemeClr val="bg2">
+              <a:lumMod val="50000"/>
+            </a:schemeClr>
+          </a:solidFill>
+          <a:ln>
+            <a:noFill/>
+          </a:ln>
+        </p:spPr>
+        <p:txBody>
+          <a:bodyPr wrap="square" rtlCol="0">
+            <a:noAutofit/>
+          </a:bodyPr>
+          <a:lstStyle/>
+          <a:p>
+            <a:pPr algn="ctr"/>
+            <a:r>
+              <a:rPr lang="fr-FR" sz="1200" dirty="0" smtClean="0">
+                <a:latin typeface="+mj-lt"/>
+              </a:rPr>
+              <a:t>site configuration</a:t>
+            </a:r>
+            <a:endParaRPr lang="fr-FR" sz="1200" dirty="0">
+              <a:latin typeface="+mj-lt"/>
+            </a:endParaRPr>
+          </a:p>
+        </p:txBody>
+      </p:sp>
+      <p:sp>
+        <p:nvSpPr>
+          <p:cNvPr id="49" name="TextBox 4"/>
+          <p:cNvSpPr txBox="1"/>
+          <p:nvPr/>
+        </p:nvSpPr>
+        <p:spPr>
+          <a:xfrm>
+            <a:off x="1907704" y="2780928"/>
+            <a:ext cx="1224136" cy="1080120"/>
+          </a:xfrm>
+          <a:prstGeom prst="rect">
+            <a:avLst/>
+          </a:prstGeom>
+          <a:solidFill>
+            <a:schemeClr val="bg2">
+              <a:lumMod val="50000"/>
+            </a:schemeClr>
+          </a:solidFill>
+          <a:ln>
+            <a:noFill/>
+          </a:ln>
+        </p:spPr>
+        <p:txBody>
+          <a:bodyPr wrap="square" rtlCol="0">
+            <a:noAutofit/>
+          </a:bodyPr>
+          <a:lstStyle/>
+          <a:p>
+            <a:pPr algn="ctr"/>
+            <a:endParaRPr lang="fr-FR" sz="1200" dirty="0" smtClean="0">
+              <a:latin typeface="+mj-lt"/>
+            </a:endParaRPr>
+          </a:p>
+          <a:p>
+            <a:pPr algn="ctr"/>
+            <a:r>
+              <a:rPr lang="fr-FR" sz="1200" dirty="0" smtClean="0">
+                <a:latin typeface="+mj-lt"/>
+              </a:rPr>
+              <a:t>Site </a:t>
+            </a:r>
+            <a:r>
+              <a:rPr lang="en-US" sz="1200" dirty="0" smtClean="0">
+                <a:latin typeface="+mj-lt"/>
+              </a:rPr>
+              <a:t>specific</a:t>
+            </a:r>
+            <a:r>
+              <a:rPr lang="fr-FR" sz="1200" dirty="0" smtClean="0">
+                <a:latin typeface="+mj-lt"/>
+              </a:rPr>
+              <a:t> </a:t>
+            </a:r>
+            <a:r>
+              <a:rPr lang="fr-FR" sz="1200" dirty="0" err="1" smtClean="0">
+                <a:latin typeface="+mj-lt"/>
+              </a:rPr>
+              <a:t>angularJS</a:t>
+            </a:r>
+            <a:r>
+              <a:rPr lang="fr-FR" sz="1200" dirty="0" smtClean="0">
+                <a:latin typeface="+mj-lt"/>
+              </a:rPr>
+              <a:t> 2 code</a:t>
+            </a:r>
+            <a:endParaRPr lang="fr-FR" sz="1200" dirty="0">
+              <a:latin typeface="+mj-lt"/>
+            </a:endParaRPr>
+          </a:p>
+        </p:txBody>
+      </p:sp>
+      <p:sp>
+        <p:nvSpPr>
+          <p:cNvPr id="52" name="TextBox 4"/>
+          <p:cNvSpPr txBox="1"/>
+          <p:nvPr/>
+        </p:nvSpPr>
+        <p:spPr>
+          <a:xfrm>
+            <a:off x="7380312" y="3183359"/>
+            <a:ext cx="1224136" cy="461665"/>
           </a:xfrm>
           <a:prstGeom prst="rect">
             <a:avLst/>
@@ -15225,9 +15571,293 @@
             </a:schemeClr>
           </a:solidFill>
           <a:ln>
-            <a:solidFill>
-              <a:schemeClr val="accent1"/>
-            </a:solidFill>
+            <a:noFill/>
+          </a:ln>
+        </p:spPr>
+        <p:txBody>
+          <a:bodyPr wrap="square" rtlCol="0">
+            <a:spAutoFit/>
+          </a:bodyPr>
+          <a:lstStyle/>
+          <a:p>
+            <a:pPr algn="ctr"/>
+            <a:r>
+              <a:rPr lang="fr-FR" sz="1200" dirty="0" smtClean="0">
+                <a:latin typeface="+mj-lt"/>
+              </a:rPr>
+              <a:t>DCF configuration</a:t>
+            </a:r>
+            <a:endParaRPr lang="fr-FR" sz="1200" dirty="0">
+              <a:latin typeface="+mj-lt"/>
+            </a:endParaRPr>
+          </a:p>
+        </p:txBody>
+      </p:sp>
+      <p:sp>
+        <p:nvSpPr>
+          <p:cNvPr id="53" name="TextBox 4"/>
+          <p:cNvSpPr txBox="1"/>
+          <p:nvPr/>
+        </p:nvSpPr>
+        <p:spPr>
+          <a:xfrm>
+            <a:off x="5436096" y="3933056"/>
+            <a:ext cx="720080" cy="504056"/>
+          </a:xfrm>
+          <a:prstGeom prst="rect">
+            <a:avLst/>
+          </a:prstGeom>
+          <a:solidFill>
+            <a:schemeClr val="bg2">
+              <a:lumMod val="50000"/>
+            </a:schemeClr>
+          </a:solidFill>
+          <a:ln>
+            <a:noFill/>
+          </a:ln>
+        </p:spPr>
+        <p:txBody>
+          <a:bodyPr wrap="square" rtlCol="0">
+            <a:noAutofit/>
+          </a:bodyPr>
+          <a:lstStyle/>
+          <a:p>
+            <a:pPr algn="ctr"/>
+            <a:r>
+              <a:rPr lang="fr-FR" sz="1200" dirty="0" smtClean="0">
+                <a:latin typeface="+mj-lt"/>
+              </a:rPr>
+              <a:t>site modules</a:t>
+            </a:r>
+            <a:endParaRPr lang="fr-FR" sz="1200" dirty="0">
+              <a:latin typeface="+mj-lt"/>
+            </a:endParaRPr>
+          </a:p>
+        </p:txBody>
+      </p:sp>
+    </p:spTree>
+  </p:cSld>
+  <p:clrMapOvr>
+    <a:masterClrMapping/>
+  </p:clrMapOvr>
+</p:sld>
+</file>
+
+<file path=ppt/slides/slide3.xml><?xml version="1.0" encoding="utf-8"?>
+<p:sld xmlns:a="http://schemas.openxmlformats.org/drawingml/2006/main" xmlns:r="http://schemas.openxmlformats.org/officeDocument/2006/relationships" xmlns:p="http://schemas.openxmlformats.org/presentationml/2006/main">
+  <p:cSld>
+    <p:spTree>
+      <p:nvGrpSpPr>
+        <p:cNvPr id="1" name=""/>
+        <p:cNvGrpSpPr/>
+        <p:nvPr/>
+      </p:nvGrpSpPr>
+      <p:grpSpPr>
+        <a:xfrm>
+          <a:off x="0" y="0"/>
+          <a:ext cx="0" cy="0"/>
+          <a:chOff x="0" y="0"/>
+          <a:chExt cx="0" cy="0"/>
+        </a:xfrm>
+      </p:grpSpPr>
+      <p:sp>
+        <p:nvSpPr>
+          <p:cNvPr id="2" name="Titre 1"/>
+          <p:cNvSpPr>
+            <a:spLocks noGrp="1"/>
+          </p:cNvSpPr>
+          <p:nvPr>
+            <p:ph type="title"/>
+          </p:nvPr>
+        </p:nvSpPr>
+        <p:spPr>
+          <a:xfrm>
+            <a:off x="914400" y="272040"/>
+            <a:ext cx="8229600" cy="708688"/>
+          </a:xfrm>
+          <a:ln>
+            <a:noFill/>
+          </a:ln>
+          <a:effectLst>
+            <a:outerShdw blurRad="44450" dist="27940" dir="5400000" algn="ctr">
+              <a:srgbClr val="000000">
+                <a:alpha val="32000"/>
+              </a:srgbClr>
+            </a:outerShdw>
+            <a:reflection blurRad="6350" stA="52000" endA="300" endPos="35000" dir="5400000" sy="-100000" algn="bl" rotWithShape="0"/>
+          </a:effectLst>
+          <a:scene3d>
+            <a:camera prst="orthographicFront">
+              <a:rot lat="0" lon="0" rev="0"/>
+            </a:camera>
+            <a:lightRig rig="balanced" dir="t">
+              <a:rot lat="0" lon="0" rev="8700000"/>
+            </a:lightRig>
+          </a:scene3d>
+          <a:sp3d>
+            <a:bevelT w="190500" h="38100"/>
+          </a:sp3d>
+        </p:spPr>
+        <p:txBody>
+          <a:bodyPr>
+            <a:noAutofit/>
+          </a:bodyPr>
+          <a:lstStyle/>
+          <a:p>
+            <a:r>
+              <a:rPr lang="en-GB" sz="3200" dirty="0" smtClean="0"/>
+              <a:t>Classic Drupal </a:t>
+            </a:r>
+            <a:r>
+              <a:rPr lang="en-GB" sz="3200" dirty="0" smtClean="0"/>
+              <a:t>6-7 </a:t>
+            </a:r>
+            <a:r>
+              <a:rPr lang="en-GB" sz="3200" dirty="0" smtClean="0"/>
+              <a:t>deployment</a:t>
+            </a:r>
+            <a:endParaRPr lang="fr-FR" sz="3000" dirty="0"/>
+          </a:p>
+        </p:txBody>
+      </p:sp>
+      <p:cxnSp>
+        <p:nvCxnSpPr>
+          <p:cNvPr id="5" name="Connecteur droit 4"/>
+          <p:cNvCxnSpPr/>
+          <p:nvPr/>
+        </p:nvCxnSpPr>
+        <p:spPr>
+          <a:xfrm>
+            <a:off x="899592" y="980728"/>
+            <a:ext cx="8244408" cy="0"/>
+          </a:xfrm>
+          <a:prstGeom prst="line">
+            <a:avLst/>
+          </a:prstGeom>
+        </p:spPr>
+        <p:style>
+          <a:lnRef idx="1">
+            <a:schemeClr val="accent1"/>
+          </a:lnRef>
+          <a:fillRef idx="0">
+            <a:schemeClr val="accent1"/>
+          </a:fillRef>
+          <a:effectRef idx="0">
+            <a:schemeClr val="accent1"/>
+          </a:effectRef>
+          <a:fontRef idx="minor">
+            <a:schemeClr val="tx1"/>
+          </a:fontRef>
+        </p:style>
+      </p:cxnSp>
+      <p:sp>
+        <p:nvSpPr>
+          <p:cNvPr id="7" name="TextBox 1"/>
+          <p:cNvSpPr txBox="1"/>
+          <p:nvPr/>
+        </p:nvSpPr>
+        <p:spPr>
+          <a:xfrm>
+            <a:off x="907366" y="4298609"/>
+            <a:ext cx="1266092" cy="276999"/>
+          </a:xfrm>
+          <a:prstGeom prst="rect">
+            <a:avLst/>
+          </a:prstGeom>
+          <a:solidFill>
+            <a:schemeClr val="bg1">
+              <a:lumMod val="40000"/>
+              <a:lumOff val="60000"/>
+            </a:schemeClr>
+          </a:solidFill>
+          <a:ln>
+            <a:noFill/>
+          </a:ln>
+        </p:spPr>
+        <p:txBody>
+          <a:bodyPr wrap="square" rtlCol="0">
+            <a:spAutoFit/>
+          </a:bodyPr>
+          <a:lstStyle/>
+          <a:p>
+            <a:pPr algn="ctr"/>
+            <a:r>
+              <a:rPr lang="fr-FR" sz="1200" dirty="0" smtClean="0">
+                <a:latin typeface="+mj-lt"/>
+              </a:rPr>
+              <a:t>DEV</a:t>
+            </a:r>
+            <a:endParaRPr lang="fr-FR" sz="1200" dirty="0">
+              <a:latin typeface="+mj-lt"/>
+            </a:endParaRPr>
+          </a:p>
+        </p:txBody>
+      </p:sp>
+      <p:sp>
+        <p:nvSpPr>
+          <p:cNvPr id="8" name="TextBox 4"/>
+          <p:cNvSpPr txBox="1"/>
+          <p:nvPr/>
+        </p:nvSpPr>
+        <p:spPr>
+          <a:xfrm>
+            <a:off x="6414869" y="4298609"/>
+            <a:ext cx="1519310" cy="276999"/>
+          </a:xfrm>
+          <a:prstGeom prst="rect">
+            <a:avLst/>
+          </a:prstGeom>
+          <a:solidFill>
+            <a:schemeClr val="bg1">
+              <a:lumMod val="40000"/>
+              <a:lumOff val="60000"/>
+            </a:schemeClr>
+          </a:solidFill>
+          <a:ln>
+            <a:noFill/>
+          </a:ln>
+        </p:spPr>
+        <p:txBody>
+          <a:bodyPr wrap="square" rtlCol="0">
+            <a:spAutoFit/>
+          </a:bodyPr>
+          <a:lstStyle/>
+          <a:p>
+            <a:pPr algn="ctr"/>
+            <a:r>
+              <a:rPr lang="fr-FR" sz="1200" dirty="0" smtClean="0">
+                <a:latin typeface="+mj-lt"/>
+              </a:rPr>
+              <a:t>PROD</a:t>
+            </a:r>
+            <a:endParaRPr lang="fr-FR" sz="1200" dirty="0">
+              <a:latin typeface="+mj-lt"/>
+            </a:endParaRPr>
+          </a:p>
+        </p:txBody>
+      </p:sp>
+      <p:sp>
+        <p:nvSpPr>
+          <p:cNvPr id="9" name="TextBox 5"/>
+          <p:cNvSpPr txBox="1"/>
+          <p:nvPr/>
+        </p:nvSpPr>
+        <p:spPr>
+          <a:xfrm>
+            <a:off x="3756074" y="3096750"/>
+            <a:ext cx="1266092" cy="276999"/>
+          </a:xfrm>
+          <a:prstGeom prst="rect">
+            <a:avLst/>
+          </a:prstGeom>
+          <a:solidFill>
+            <a:schemeClr val="bg1">
+              <a:lumMod val="40000"/>
+              <a:lumOff val="60000"/>
+            </a:schemeClr>
+          </a:solidFill>
+          <a:ln>
+            <a:noFill/>
           </a:ln>
         </p:spPr>
         <p:txBody>
@@ -16282,7 +16912,11 @@
             </a:r>
             <a:r>
               <a:rPr lang="en-GB" sz="3200" dirty="0" smtClean="0"/>
-              <a:t>8 update</a:t>
+              <a:t>6-7 </a:t>
+            </a:r>
+            <a:r>
+              <a:rPr lang="en-GB" sz="3200" dirty="0" smtClean="0"/>
+              <a:t>update</a:t>
             </a:r>
             <a:endParaRPr lang="fr-FR" sz="3000" dirty="0"/>
           </a:p>
@@ -16339,9 +16973,7 @@
             </a:schemeClr>
           </a:solidFill>
           <a:ln>
-            <a:solidFill>
-              <a:schemeClr val="accent1"/>
-            </a:solidFill>
+            <a:noFill/>
           </a:ln>
         </p:spPr>
         <p:txBody>
@@ -16384,9 +17016,7 @@
             </a:schemeClr>
           </a:solidFill>
           <a:ln>
-            <a:solidFill>
-              <a:schemeClr val="accent1"/>
-            </a:solidFill>
+            <a:noFill/>
           </a:ln>
         </p:spPr>
         <p:txBody>
@@ -16429,9 +17059,7 @@
             </a:schemeClr>
           </a:solidFill>
           <a:ln>
-            <a:solidFill>
-              <a:schemeClr val="accent1"/>
-            </a:solidFill>
+            <a:noFill/>
           </a:ln>
         </p:spPr>
         <p:txBody>
@@ -17425,15 +18053,7 @@
           <a:p>
             <a:r>
               <a:rPr lang="en-GB" sz="3200" dirty="0" smtClean="0"/>
-              <a:t>DCF</a:t>
-            </a:r>
-            <a:r>
-              <a:rPr lang="en-GB" sz="3200" dirty="0" smtClean="0"/>
-              <a:t> </a:t>
-            </a:r>
-            <a:r>
-              <a:rPr lang="en-GB" sz="3200" dirty="0" smtClean="0"/>
-              <a:t>deployment</a:t>
+              <a:t>DCF deployment</a:t>
             </a:r>
             <a:endParaRPr lang="fr-FR" sz="3000" dirty="0"/>
           </a:p>
@@ -17490,9 +18110,7 @@
             </a:schemeClr>
           </a:solidFill>
           <a:ln>
-            <a:solidFill>
-              <a:schemeClr val="accent1"/>
-            </a:solidFill>
+            <a:noFill/>
           </a:ln>
         </p:spPr>
         <p:txBody>
@@ -17535,9 +18153,7 @@
             </a:schemeClr>
           </a:solidFill>
           <a:ln>
-            <a:solidFill>
-              <a:schemeClr val="accent1"/>
-            </a:solidFill>
+            <a:noFill/>
           </a:ln>
         </p:spPr>
         <p:txBody>
@@ -17580,9 +18196,7 @@
             </a:schemeClr>
           </a:solidFill>
           <a:ln>
-            <a:solidFill>
-              <a:schemeClr val="accent1"/>
-            </a:solidFill>
+            <a:noFill/>
           </a:ln>
         </p:spPr>
         <p:txBody>
@@ -18090,16 +18704,7 @@
                 </a:solidFill>
                 <a:latin typeface="+mj-lt"/>
               </a:rPr>
-              <a:t>Copy code and </a:t>
-            </a:r>
-            <a:r>
-              <a:rPr lang="fr-FR" sz="1200" dirty="0" smtClean="0">
-                <a:solidFill>
-                  <a:schemeClr val="tx1"/>
-                </a:solidFill>
-                <a:latin typeface="+mj-lt"/>
-              </a:rPr>
-              <a:t>installation</a:t>
+              <a:t>Copy code and installation</a:t>
             </a:r>
           </a:p>
           <a:p>
@@ -18311,11 +18916,7 @@
           <a:p>
             <a:r>
               <a:rPr lang="en-GB" sz="3200" dirty="0" smtClean="0"/>
-              <a:t>DCF </a:t>
-            </a:r>
-            <a:r>
-              <a:rPr lang="en-GB" sz="3200" dirty="0" smtClean="0"/>
-              <a:t>update</a:t>
+              <a:t>DCF update</a:t>
             </a:r>
             <a:endParaRPr lang="fr-FR" sz="3000" dirty="0"/>
           </a:p>
@@ -18372,9 +18973,7 @@
             </a:schemeClr>
           </a:solidFill>
           <a:ln>
-            <a:solidFill>
-              <a:schemeClr val="accent1"/>
-            </a:solidFill>
+            <a:noFill/>
           </a:ln>
         </p:spPr>
         <p:txBody>
@@ -18417,9 +19016,7 @@
             </a:schemeClr>
           </a:solidFill>
           <a:ln>
-            <a:solidFill>
-              <a:schemeClr val="accent1"/>
-            </a:solidFill>
+            <a:noFill/>
           </a:ln>
         </p:spPr>
         <p:txBody>
@@ -18462,9 +19059,7 @@
             </a:schemeClr>
           </a:solidFill>
           <a:ln>
-            <a:solidFill>
-              <a:schemeClr val="accent1"/>
-            </a:solidFill>
+            <a:noFill/>
           </a:ln>
         </p:spPr>
         <p:txBody>

</xml_diff>